<commit_message>
Subindo atualização do power point e pesquisa o que tem no pmbok
</commit_message>
<xml_diff>
--- a/SLIDES/APRESENTAÇAO-DE-SEGUNDA.pptx
+++ b/SLIDES/APRESENTAÇAO-DE-SEGUNDA.pptx
@@ -8,9 +8,21 @@
     <p:sldId id="256" r:id="rId2"/>
     <p:sldId id="257" r:id="rId3"/>
     <p:sldId id="259" r:id="rId4"/>
-    <p:sldId id="258" r:id="rId5"/>
-    <p:sldId id="260" r:id="rId6"/>
-    <p:sldId id="261" r:id="rId7"/>
+    <p:sldId id="262" r:id="rId5"/>
+    <p:sldId id="265" r:id="rId6"/>
+    <p:sldId id="266" r:id="rId7"/>
+    <p:sldId id="267" r:id="rId8"/>
+    <p:sldId id="268" r:id="rId9"/>
+    <p:sldId id="269" r:id="rId10"/>
+    <p:sldId id="270" r:id="rId11"/>
+    <p:sldId id="271" r:id="rId12"/>
+    <p:sldId id="272" r:id="rId13"/>
+    <p:sldId id="273" r:id="rId14"/>
+    <p:sldId id="258" r:id="rId15"/>
+    <p:sldId id="264" r:id="rId16"/>
+    <p:sldId id="260" r:id="rId17"/>
+    <p:sldId id="263" r:id="rId18"/>
+    <p:sldId id="261" r:id="rId19"/>
   </p:sldIdLst>
   <p:sldSz cx="12192000" cy="6858000"/>
   <p:notesSz cx="6858000" cy="9144000"/>
@@ -521,7 +533,7 @@
             <a:fld id="{B61BEF0D-F0BB-DE4B-95CE-6DB70DBA9567}" type="datetimeFigureOut">
               <a:rPr lang="en-US" smtClean="0"/>
               <a:pPr/>
-              <a:t>11/9/2018</a:t>
+              <a:t>11/11/2018</a:t>
             </a:fld>
             <a:endParaRPr lang="en-US" dirty="0"/>
           </a:p>
@@ -709,7 +721,7 @@
             <a:fld id="{B61BEF0D-F0BB-DE4B-95CE-6DB70DBA9567}" type="datetimeFigureOut">
               <a:rPr lang="en-US" smtClean="0"/>
               <a:pPr/>
-              <a:t>11/9/2018</a:t>
+              <a:t>11/11/2018</a:t>
             </a:fld>
             <a:endParaRPr lang="en-US" dirty="0"/>
           </a:p>
@@ -898,7 +910,7 @@
             <a:fld id="{B61BEF0D-F0BB-DE4B-95CE-6DB70DBA9567}" type="datetimeFigureOut">
               <a:rPr lang="en-US" smtClean="0"/>
               <a:pPr/>
-              <a:t>11/9/2018</a:t>
+              <a:t>11/11/2018</a:t>
             </a:fld>
             <a:endParaRPr lang="en-US" dirty="0"/>
           </a:p>
@@ -1076,7 +1088,7 @@
           <a:p>
             <a:fld id="{52647F38-B617-4D2F-AE0A-013F0C4D2C57}" type="datetimeFigureOut">
               <a:rPr lang="en-US" smtClean="0"/>
-              <a:t>11/9/2018</a:t>
+              <a:t>11/11/2018</a:t>
             </a:fld>
             <a:endParaRPr lang="en-US" dirty="0"/>
           </a:p>
@@ -1397,7 +1409,7 @@
             <a:fld id="{B61BEF0D-F0BB-DE4B-95CE-6DB70DBA9567}" type="datetimeFigureOut">
               <a:rPr lang="en-US" smtClean="0"/>
               <a:pPr/>
-              <a:t>11/9/2018</a:t>
+              <a:t>11/11/2018</a:t>
             </a:fld>
             <a:endParaRPr lang="en-US" dirty="0"/>
           </a:p>
@@ -1791,7 +1803,7 @@
           <a:p>
             <a:fld id="{05BFA754-D5C3-4E66-96A6-867B257F58DC}" type="datetimeFigureOut">
               <a:rPr lang="en-US" smtClean="0"/>
-              <a:t>11/9/2018</a:t>
+              <a:t>11/11/2018</a:t>
             </a:fld>
             <a:endParaRPr lang="en-US" dirty="0"/>
           </a:p>
@@ -2233,7 +2245,7 @@
             <a:fld id="{B61BEF0D-F0BB-DE4B-95CE-6DB70DBA9567}" type="datetimeFigureOut">
               <a:rPr lang="en-US" smtClean="0"/>
               <a:pPr/>
-              <a:t>11/9/2018</a:t>
+              <a:t>11/11/2018</a:t>
             </a:fld>
             <a:endParaRPr lang="en-US" dirty="0"/>
           </a:p>
@@ -2360,7 +2372,7 @@
             <a:fld id="{B61BEF0D-F0BB-DE4B-95CE-6DB70DBA9567}" type="datetimeFigureOut">
               <a:rPr lang="en-US" smtClean="0"/>
               <a:pPr/>
-              <a:t>11/9/2018</a:t>
+              <a:t>11/11/2018</a:t>
             </a:fld>
             <a:endParaRPr lang="en-US" dirty="0"/>
           </a:p>
@@ -2464,7 +2476,7 @@
             <a:fld id="{B61BEF0D-F0BB-DE4B-95CE-6DB70DBA9567}" type="datetimeFigureOut">
               <a:rPr lang="en-US" smtClean="0"/>
               <a:pPr/>
-              <a:t>11/9/2018</a:t>
+              <a:t>11/11/2018</a:t>
             </a:fld>
             <a:endParaRPr lang="en-US" dirty="0"/>
           </a:p>
@@ -2823,7 +2835,7 @@
             <a:fld id="{B61BEF0D-F0BB-DE4B-95CE-6DB70DBA9567}" type="datetimeFigureOut">
               <a:rPr lang="en-US" smtClean="0"/>
               <a:pPr/>
-              <a:t>11/9/2018</a:t>
+              <a:t>11/11/2018</a:t>
             </a:fld>
             <a:endParaRPr lang="en-US" dirty="0"/>
           </a:p>
@@ -3257,7 +3269,7 @@
             <a:fld id="{B61BEF0D-F0BB-DE4B-95CE-6DB70DBA9567}" type="datetimeFigureOut">
               <a:rPr lang="en-US" smtClean="0"/>
               <a:pPr/>
-              <a:t>11/9/2018</a:t>
+              <a:t>11/11/2018</a:t>
             </a:fld>
             <a:endParaRPr lang="en-US" dirty="0"/>
           </a:p>
@@ -3540,7 +3552,7 @@
             <a:fld id="{B61BEF0D-F0BB-DE4B-95CE-6DB70DBA9567}" type="datetimeFigureOut">
               <a:rPr lang="en-US" smtClean="0"/>
               <a:pPr/>
-              <a:t>11/9/2018</a:t>
+              <a:t>11/11/2018</a:t>
             </a:fld>
             <a:endParaRPr lang="en-US" dirty="0"/>
           </a:p>
@@ -4147,9 +4159,16 @@
             <a:pPr algn="ctr"/>
             <a:r>
               <a:rPr lang="pt-BR" dirty="0" smtClean="0"/>
-              <a:t>PMBOK</a:t>
-            </a:r>
-            <a:endParaRPr lang="pt-BR" dirty="0"/>
+              <a:t>**PMBOK**</a:t>
+            </a:r>
+            <a:br>
+              <a:rPr lang="pt-BR" dirty="0" smtClean="0"/>
+            </a:br>
+            <a:r>
+              <a:rPr lang="en-US" sz="3600" dirty="0"/>
+              <a:t>PROJECT MANAGEMENT BODY OF KNOWLEDGE</a:t>
+            </a:r>
+            <a:endParaRPr lang="pt-BR" sz="3600" dirty="0"/>
           </a:p>
         </p:txBody>
       </p:sp>
@@ -4167,6 +4186,1247 @@
     <mc:Choice Requires="p14">
       <p:transition spd="slow" p14:dur="2000">
         <p14:prism isContent="1"/>
+      </p:transition>
+    </mc:Choice>
+    <mc:Fallback xmlns="">
+      <p:transition spd="slow">
+        <p:fade/>
+      </p:transition>
+    </mc:Fallback>
+  </mc:AlternateContent>
+  <p:timing>
+    <p:tnLst>
+      <p:par>
+        <p:cTn id="1" dur="indefinite" restart="never" nodeType="tmRoot"/>
+      </p:par>
+    </p:tnLst>
+  </p:timing>
+</p:sld>
+</file>
+
+<file path=ppt/slides/slide10.xml><?xml version="1.0" encoding="utf-8"?>
+<p:sld xmlns:a="http://schemas.openxmlformats.org/drawingml/2006/main" xmlns:r="http://schemas.openxmlformats.org/officeDocument/2006/relationships" xmlns:p="http://schemas.openxmlformats.org/presentationml/2006/main">
+  <p:cSld>
+    <p:spTree>
+      <p:nvGrpSpPr>
+        <p:cNvPr id="1" name=""/>
+        <p:cNvGrpSpPr/>
+        <p:nvPr/>
+      </p:nvGrpSpPr>
+      <p:grpSpPr>
+        <a:xfrm>
+          <a:off x="0" y="0"/>
+          <a:ext cx="0" cy="0"/>
+          <a:chOff x="0" y="0"/>
+          <a:chExt cx="0" cy="0"/>
+        </a:xfrm>
+      </p:grpSpPr>
+      <p:sp>
+        <p:nvSpPr>
+          <p:cNvPr id="2" name="Título 1"/>
+          <p:cNvSpPr>
+            <a:spLocks noGrp="1"/>
+          </p:cNvSpPr>
+          <p:nvPr>
+            <p:ph type="ctrTitle"/>
+          </p:nvPr>
+        </p:nvSpPr>
+        <p:spPr>
+          <a:xfrm>
+            <a:off x="1051560" y="1521123"/>
+            <a:ext cx="9966960" cy="3035808"/>
+          </a:xfrm>
+        </p:spPr>
+        <p:txBody>
+          <a:bodyPr/>
+          <a:lstStyle/>
+          <a:p>
+            <a:pPr lvl="0"/>
+            <a:r>
+              <a:rPr lang="pt-BR" sz="3200" dirty="0" smtClean="0"/>
+              <a:t>Gerenciamento de riscos</a:t>
+            </a:r>
+            <a:br>
+              <a:rPr lang="pt-BR" sz="3200" dirty="0" smtClean="0"/>
+            </a:br>
+            <a:r>
+              <a:rPr lang="pt-BR" sz="3200" dirty="0" smtClean="0"/>
+              <a:t/>
+            </a:r>
+            <a:br>
+              <a:rPr lang="pt-BR" sz="3200" dirty="0" smtClean="0"/>
+            </a:br>
+            <a:r>
+              <a:rPr lang="pt-BR" sz="3200" dirty="0" smtClean="0"/>
+              <a:t>*</a:t>
+            </a:r>
+            <a:r>
+              <a:rPr lang="pt-BR" sz="2400" dirty="0" smtClean="0"/>
+              <a:t>planejamento </a:t>
+            </a:r>
+            <a:r>
+              <a:rPr lang="pt-BR" sz="2400" dirty="0"/>
+              <a:t>do gerenciamento de riscos;</a:t>
+            </a:r>
+            <a:br>
+              <a:rPr lang="pt-BR" sz="2400" dirty="0"/>
+            </a:br>
+            <a:r>
+              <a:rPr lang="pt-BR" sz="2400" dirty="0" smtClean="0"/>
+              <a:t>*identificação </a:t>
+            </a:r>
+            <a:r>
+              <a:rPr lang="pt-BR" sz="2400" dirty="0"/>
+              <a:t>de riscos;</a:t>
+            </a:r>
+            <a:br>
+              <a:rPr lang="pt-BR" sz="2400" dirty="0"/>
+            </a:br>
+            <a:r>
+              <a:rPr lang="pt-BR" sz="2400" dirty="0" smtClean="0"/>
+              <a:t>*análise </a:t>
+            </a:r>
+            <a:r>
+              <a:rPr lang="pt-BR" sz="2400" dirty="0"/>
+              <a:t>qualitativa de riscos;</a:t>
+            </a:r>
+            <a:br>
+              <a:rPr lang="pt-BR" sz="2400" dirty="0"/>
+            </a:br>
+            <a:r>
+              <a:rPr lang="pt-BR" sz="2400" dirty="0" smtClean="0"/>
+              <a:t>*análise </a:t>
+            </a:r>
+            <a:r>
+              <a:rPr lang="pt-BR" sz="2400" dirty="0"/>
+              <a:t>quantitativa de riscos;</a:t>
+            </a:r>
+            <a:br>
+              <a:rPr lang="pt-BR" sz="2400" dirty="0"/>
+            </a:br>
+            <a:r>
+              <a:rPr lang="pt-BR" sz="2400" dirty="0" smtClean="0"/>
+              <a:t>*planejamento </a:t>
+            </a:r>
+            <a:r>
+              <a:rPr lang="pt-BR" sz="2400" dirty="0"/>
+              <a:t>de respostas a riscos</a:t>
+            </a:r>
+            <a:r>
+              <a:rPr lang="pt-BR" sz="2400" dirty="0" smtClean="0"/>
+              <a:t>;</a:t>
+            </a:r>
+            <a:r>
+              <a:rPr lang="pt-BR" sz="2400" dirty="0"/>
+              <a:t/>
+            </a:r>
+            <a:br>
+              <a:rPr lang="pt-BR" sz="2400" dirty="0"/>
+            </a:br>
+            <a:r>
+              <a:rPr lang="pt-BR" sz="2400" dirty="0" smtClean="0"/>
+              <a:t>*monitoramento </a:t>
+            </a:r>
+            <a:r>
+              <a:rPr lang="pt-BR" sz="2400" dirty="0"/>
+              <a:t>e controle de riscos.</a:t>
+            </a:r>
+            <a:br>
+              <a:rPr lang="pt-BR" sz="2400" dirty="0"/>
+            </a:br>
+            <a:r>
+              <a:rPr lang="pt-BR" sz="2400" dirty="0"/>
+              <a:t/>
+            </a:r>
+            <a:br>
+              <a:rPr lang="pt-BR" sz="2400" dirty="0"/>
+            </a:br>
+            <a:endParaRPr lang="pt-BR" sz="2400" dirty="0"/>
+          </a:p>
+        </p:txBody>
+      </p:sp>
+    </p:spTree>
+    <p:extLst>
+      <p:ext uri="{BB962C8B-B14F-4D97-AF65-F5344CB8AC3E}">
+        <p14:creationId xmlns:p14="http://schemas.microsoft.com/office/powerpoint/2010/main" val="4117417001"/>
+      </p:ext>
+    </p:extLst>
+  </p:cSld>
+  <p:clrMapOvr>
+    <a:masterClrMapping/>
+  </p:clrMapOvr>
+  <mc:AlternateContent xmlns:mc="http://schemas.openxmlformats.org/markup-compatibility/2006" xmlns:p14="http://schemas.microsoft.com/office/powerpoint/2010/main">
+    <mc:Choice Requires="p14">
+      <p:transition spd="slow" p14:dur="2000">
+        <p14:prism isContent="1"/>
+      </p:transition>
+    </mc:Choice>
+    <mc:Fallback xmlns="">
+      <p:transition spd="slow">
+        <p:fade/>
+      </p:transition>
+    </mc:Fallback>
+  </mc:AlternateContent>
+  <p:timing>
+    <p:tnLst>
+      <p:par>
+        <p:cTn id="1" dur="indefinite" restart="never" nodeType="tmRoot"/>
+      </p:par>
+    </p:tnLst>
+  </p:timing>
+</p:sld>
+</file>
+
+<file path=ppt/slides/slide11.xml><?xml version="1.0" encoding="utf-8"?>
+<p:sld xmlns:a="http://schemas.openxmlformats.org/drawingml/2006/main" xmlns:r="http://schemas.openxmlformats.org/officeDocument/2006/relationships" xmlns:p="http://schemas.openxmlformats.org/presentationml/2006/main">
+  <p:cSld>
+    <p:spTree>
+      <p:nvGrpSpPr>
+        <p:cNvPr id="1" name=""/>
+        <p:cNvGrpSpPr/>
+        <p:nvPr/>
+      </p:nvGrpSpPr>
+      <p:grpSpPr>
+        <a:xfrm>
+          <a:off x="0" y="0"/>
+          <a:ext cx="0" cy="0"/>
+          <a:chOff x="0" y="0"/>
+          <a:chExt cx="0" cy="0"/>
+        </a:xfrm>
+      </p:grpSpPr>
+      <p:sp>
+        <p:nvSpPr>
+          <p:cNvPr id="2" name="Título 1"/>
+          <p:cNvSpPr>
+            <a:spLocks noGrp="1"/>
+          </p:cNvSpPr>
+          <p:nvPr>
+            <p:ph type="ctrTitle"/>
+          </p:nvPr>
+        </p:nvSpPr>
+        <p:spPr>
+          <a:xfrm>
+            <a:off x="1051560" y="1254423"/>
+            <a:ext cx="9966960" cy="3035808"/>
+          </a:xfrm>
+        </p:spPr>
+        <p:txBody>
+          <a:bodyPr/>
+          <a:lstStyle/>
+          <a:p>
+            <a:pPr lvl="0"/>
+            <a:r>
+              <a:rPr lang="pt-BR" sz="3200" dirty="0" smtClean="0"/>
+              <a:t>Gerenciamento de aquisições</a:t>
+            </a:r>
+            <a:br>
+              <a:rPr lang="pt-BR" sz="3200" dirty="0" smtClean="0"/>
+            </a:br>
+            <a:r>
+              <a:rPr lang="pt-BR" sz="3200" dirty="0" smtClean="0"/>
+              <a:t/>
+            </a:r>
+            <a:br>
+              <a:rPr lang="pt-BR" sz="3200" dirty="0" smtClean="0"/>
+            </a:br>
+            <a:r>
+              <a:rPr lang="pt-BR" sz="3200" dirty="0" smtClean="0"/>
+              <a:t>*</a:t>
+            </a:r>
+            <a:r>
+              <a:rPr lang="pt-BR" sz="2400" dirty="0" smtClean="0"/>
+              <a:t>planejar </a:t>
+            </a:r>
+            <a:r>
+              <a:rPr lang="pt-BR" sz="2400" dirty="0"/>
+              <a:t>o gerenciamento de aquisições;</a:t>
+            </a:r>
+            <a:br>
+              <a:rPr lang="pt-BR" sz="2400" dirty="0"/>
+            </a:br>
+            <a:r>
+              <a:rPr lang="pt-BR" sz="2400" dirty="0" smtClean="0"/>
+              <a:t>*conduzir </a:t>
+            </a:r>
+            <a:r>
+              <a:rPr lang="pt-BR" sz="2400" dirty="0"/>
+              <a:t>aquisições;</a:t>
+            </a:r>
+            <a:br>
+              <a:rPr lang="pt-BR" sz="2400" dirty="0"/>
+            </a:br>
+            <a:r>
+              <a:rPr lang="pt-BR" sz="2400" dirty="0" smtClean="0"/>
+              <a:t>*controlar </a:t>
+            </a:r>
+            <a:r>
+              <a:rPr lang="pt-BR" sz="2400" dirty="0"/>
+              <a:t>aquisições;</a:t>
+            </a:r>
+            <a:br>
+              <a:rPr lang="pt-BR" sz="2400" dirty="0"/>
+            </a:br>
+            <a:r>
+              <a:rPr lang="pt-BR" sz="2400" dirty="0" smtClean="0"/>
+              <a:t>*encerrar </a:t>
+            </a:r>
+            <a:r>
+              <a:rPr lang="pt-BR" sz="2400" dirty="0"/>
+              <a:t>aquisições.</a:t>
+            </a:r>
+            <a:br>
+              <a:rPr lang="pt-BR" sz="2400" dirty="0"/>
+            </a:br>
+            <a:r>
+              <a:rPr lang="pt-BR" sz="2400" dirty="0"/>
+              <a:t/>
+            </a:r>
+            <a:br>
+              <a:rPr lang="pt-BR" sz="2400" dirty="0"/>
+            </a:br>
+            <a:endParaRPr lang="pt-BR" sz="2400" dirty="0"/>
+          </a:p>
+        </p:txBody>
+      </p:sp>
+    </p:spTree>
+    <p:extLst>
+      <p:ext uri="{BB962C8B-B14F-4D97-AF65-F5344CB8AC3E}">
+        <p14:creationId xmlns:p14="http://schemas.microsoft.com/office/powerpoint/2010/main" val="1659486838"/>
+      </p:ext>
+    </p:extLst>
+  </p:cSld>
+  <p:clrMapOvr>
+    <a:masterClrMapping/>
+  </p:clrMapOvr>
+  <mc:AlternateContent xmlns:mc="http://schemas.openxmlformats.org/markup-compatibility/2006" xmlns:p14="http://schemas.microsoft.com/office/powerpoint/2010/main">
+    <mc:Choice Requires="p14">
+      <p:transition spd="slow" p14:dur="2000">
+        <p14:prism isContent="1"/>
+      </p:transition>
+    </mc:Choice>
+    <mc:Fallback xmlns="">
+      <p:transition spd="slow">
+        <p:fade/>
+      </p:transition>
+    </mc:Fallback>
+  </mc:AlternateContent>
+  <p:timing>
+    <p:tnLst>
+      <p:par>
+        <p:cTn id="1" dur="indefinite" restart="never" nodeType="tmRoot"/>
+      </p:par>
+    </p:tnLst>
+  </p:timing>
+</p:sld>
+</file>
+
+<file path=ppt/slides/slide12.xml><?xml version="1.0" encoding="utf-8"?>
+<p:sld xmlns:a="http://schemas.openxmlformats.org/drawingml/2006/main" xmlns:r="http://schemas.openxmlformats.org/officeDocument/2006/relationships" xmlns:p="http://schemas.openxmlformats.org/presentationml/2006/main">
+  <p:cSld>
+    <p:spTree>
+      <p:nvGrpSpPr>
+        <p:cNvPr id="1" name=""/>
+        <p:cNvGrpSpPr/>
+        <p:nvPr/>
+      </p:nvGrpSpPr>
+      <p:grpSpPr>
+        <a:xfrm>
+          <a:off x="0" y="0"/>
+          <a:ext cx="0" cy="0"/>
+          <a:chOff x="0" y="0"/>
+          <a:chExt cx="0" cy="0"/>
+        </a:xfrm>
+      </p:grpSpPr>
+      <p:sp>
+        <p:nvSpPr>
+          <p:cNvPr id="2" name="Título 1"/>
+          <p:cNvSpPr>
+            <a:spLocks noGrp="1"/>
+          </p:cNvSpPr>
+          <p:nvPr>
+            <p:ph type="ctrTitle"/>
+          </p:nvPr>
+        </p:nvSpPr>
+        <p:spPr>
+          <a:xfrm>
+            <a:off x="1051560" y="1356023"/>
+            <a:ext cx="9966960" cy="3035808"/>
+          </a:xfrm>
+        </p:spPr>
+        <p:txBody>
+          <a:bodyPr/>
+          <a:lstStyle/>
+          <a:p>
+            <a:pPr lvl="0"/>
+            <a:r>
+              <a:rPr lang="pt-BR" sz="3200" dirty="0" smtClean="0"/>
+              <a:t>Gerenciamento da integração</a:t>
+            </a:r>
+            <a:br>
+              <a:rPr lang="pt-BR" sz="3200" dirty="0" smtClean="0"/>
+            </a:br>
+            <a:r>
+              <a:rPr lang="pt-BR" sz="3200" dirty="0" smtClean="0"/>
+              <a:t/>
+            </a:r>
+            <a:br>
+              <a:rPr lang="pt-BR" sz="3200" dirty="0" smtClean="0"/>
+            </a:br>
+            <a:r>
+              <a:rPr lang="pt-BR" sz="3200" dirty="0" smtClean="0"/>
+              <a:t>*</a:t>
+            </a:r>
+            <a:r>
+              <a:rPr lang="pt-BR" sz="2400" dirty="0" smtClean="0"/>
+              <a:t>desenvolver </a:t>
+            </a:r>
+            <a:r>
+              <a:rPr lang="pt-BR" sz="2400" dirty="0"/>
+              <a:t>o termo de abertura;</a:t>
+            </a:r>
+            <a:br>
+              <a:rPr lang="pt-BR" sz="2400" dirty="0"/>
+            </a:br>
+            <a:r>
+              <a:rPr lang="pt-BR" sz="2400" dirty="0" smtClean="0"/>
+              <a:t>*desenvolver </a:t>
+            </a:r>
+            <a:r>
+              <a:rPr lang="pt-BR" sz="2400" dirty="0"/>
+              <a:t>o plano de gerenciamento de projetos;</a:t>
+            </a:r>
+            <a:br>
+              <a:rPr lang="pt-BR" sz="2400" dirty="0"/>
+            </a:br>
+            <a:r>
+              <a:rPr lang="pt-BR" sz="2400" dirty="0" smtClean="0"/>
+              <a:t>*orientar </a:t>
+            </a:r>
+            <a:r>
+              <a:rPr lang="pt-BR" sz="2400" dirty="0"/>
+              <a:t>e gerenciar a execução do projeto;</a:t>
+            </a:r>
+            <a:br>
+              <a:rPr lang="pt-BR" sz="2400" dirty="0"/>
+            </a:br>
+            <a:r>
+              <a:rPr lang="pt-BR" sz="2400" dirty="0" smtClean="0"/>
+              <a:t>*monitorar </a:t>
+            </a:r>
+            <a:r>
+              <a:rPr lang="pt-BR" sz="2400" dirty="0"/>
+              <a:t>e controlar o trabalho do projeto;</a:t>
+            </a:r>
+            <a:br>
+              <a:rPr lang="pt-BR" sz="2400" dirty="0"/>
+            </a:br>
+            <a:r>
+              <a:rPr lang="pt-BR" sz="2400" dirty="0" smtClean="0"/>
+              <a:t>*realizar </a:t>
+            </a:r>
+            <a:r>
+              <a:rPr lang="pt-BR" sz="2400" dirty="0"/>
+              <a:t>controle integrado de mudanças;</a:t>
+            </a:r>
+            <a:br>
+              <a:rPr lang="pt-BR" sz="2400" dirty="0"/>
+            </a:br>
+            <a:r>
+              <a:rPr lang="pt-BR" sz="2400" dirty="0" smtClean="0"/>
+              <a:t>*encerrar </a:t>
+            </a:r>
+            <a:r>
+              <a:rPr lang="pt-BR" sz="2400" dirty="0"/>
+              <a:t>o projeto ou fase.</a:t>
+            </a:r>
+            <a:br>
+              <a:rPr lang="pt-BR" sz="2400" dirty="0"/>
+            </a:br>
+            <a:endParaRPr lang="pt-BR" sz="2400" dirty="0"/>
+          </a:p>
+        </p:txBody>
+      </p:sp>
+    </p:spTree>
+    <p:extLst>
+      <p:ext uri="{BB962C8B-B14F-4D97-AF65-F5344CB8AC3E}">
+        <p14:creationId xmlns:p14="http://schemas.microsoft.com/office/powerpoint/2010/main" val="3042374264"/>
+      </p:ext>
+    </p:extLst>
+  </p:cSld>
+  <p:clrMapOvr>
+    <a:masterClrMapping/>
+  </p:clrMapOvr>
+  <mc:AlternateContent xmlns:mc="http://schemas.openxmlformats.org/markup-compatibility/2006" xmlns:p14="http://schemas.microsoft.com/office/powerpoint/2010/main">
+    <mc:Choice Requires="p14">
+      <p:transition spd="slow" p14:dur="2000">
+        <p14:prism isContent="1"/>
+      </p:transition>
+    </mc:Choice>
+    <mc:Fallback xmlns="">
+      <p:transition spd="slow">
+        <p:fade/>
+      </p:transition>
+    </mc:Fallback>
+  </mc:AlternateContent>
+  <p:timing>
+    <p:tnLst>
+      <p:par>
+        <p:cTn id="1" dur="indefinite" restart="never" nodeType="tmRoot"/>
+      </p:par>
+    </p:tnLst>
+  </p:timing>
+</p:sld>
+</file>
+
+<file path=ppt/slides/slide13.xml><?xml version="1.0" encoding="utf-8"?>
+<p:sld xmlns:a="http://schemas.openxmlformats.org/drawingml/2006/main" xmlns:r="http://schemas.openxmlformats.org/officeDocument/2006/relationships" xmlns:p="http://schemas.openxmlformats.org/presentationml/2006/main">
+  <p:cSld>
+    <p:spTree>
+      <p:nvGrpSpPr>
+        <p:cNvPr id="1" name=""/>
+        <p:cNvGrpSpPr/>
+        <p:nvPr/>
+      </p:nvGrpSpPr>
+      <p:grpSpPr>
+        <a:xfrm>
+          <a:off x="0" y="0"/>
+          <a:ext cx="0" cy="0"/>
+          <a:chOff x="0" y="0"/>
+          <a:chExt cx="0" cy="0"/>
+        </a:xfrm>
+      </p:grpSpPr>
+      <p:sp>
+        <p:nvSpPr>
+          <p:cNvPr id="2" name="Título 1"/>
+          <p:cNvSpPr>
+            <a:spLocks noGrp="1"/>
+          </p:cNvSpPr>
+          <p:nvPr>
+            <p:ph type="ctrTitle"/>
+          </p:nvPr>
+        </p:nvSpPr>
+        <p:spPr>
+          <a:xfrm>
+            <a:off x="1051560" y="1229023"/>
+            <a:ext cx="9966960" cy="3035808"/>
+          </a:xfrm>
+        </p:spPr>
+        <p:txBody>
+          <a:bodyPr/>
+          <a:lstStyle/>
+          <a:p>
+            <a:pPr lvl="0"/>
+            <a:r>
+              <a:rPr lang="pt-BR" sz="3200" dirty="0" smtClean="0"/>
+              <a:t>Gerenciamento de </a:t>
+            </a:r>
+            <a:r>
+              <a:rPr lang="pt-BR" sz="3200" dirty="0" err="1" smtClean="0"/>
+              <a:t>stakeholders</a:t>
+            </a:r>
+            <a:r>
+              <a:rPr lang="pt-BR" sz="3200" dirty="0" smtClean="0"/>
+              <a:t/>
+            </a:r>
+            <a:br>
+              <a:rPr lang="pt-BR" sz="3200" dirty="0" smtClean="0"/>
+            </a:br>
+            <a:r>
+              <a:rPr lang="pt-BR" sz="3200" dirty="0" smtClean="0"/>
+              <a:t/>
+            </a:r>
+            <a:br>
+              <a:rPr lang="pt-BR" sz="3200" dirty="0" smtClean="0"/>
+            </a:br>
+            <a:r>
+              <a:rPr lang="pt-BR" sz="3200" dirty="0" smtClean="0"/>
+              <a:t>*</a:t>
+            </a:r>
+            <a:r>
+              <a:rPr lang="pt-BR" sz="2400" dirty="0" smtClean="0"/>
+              <a:t>identificar </a:t>
+            </a:r>
+            <a:r>
+              <a:rPr lang="pt-BR" sz="2400" dirty="0"/>
+              <a:t>os </a:t>
+            </a:r>
+            <a:r>
+              <a:rPr lang="pt-BR" sz="2400" dirty="0" err="1"/>
+              <a:t>stakeholders</a:t>
+            </a:r>
+            <a:r>
+              <a:rPr lang="pt-BR" sz="2400" dirty="0"/>
+              <a:t>;</a:t>
+            </a:r>
+            <a:br>
+              <a:rPr lang="pt-BR" sz="2400" dirty="0"/>
+            </a:br>
+            <a:r>
+              <a:rPr lang="pt-BR" sz="2400" dirty="0" smtClean="0"/>
+              <a:t>*planejar </a:t>
+            </a:r>
+            <a:r>
+              <a:rPr lang="pt-BR" sz="2400" dirty="0"/>
+              <a:t>o gerenciamento dos </a:t>
+            </a:r>
+            <a:r>
+              <a:rPr lang="pt-BR" sz="2400" dirty="0" err="1"/>
+              <a:t>stakeholders</a:t>
+            </a:r>
+            <a:r>
+              <a:rPr lang="pt-BR" sz="2400" dirty="0"/>
+              <a:t>;</a:t>
+            </a:r>
+            <a:br>
+              <a:rPr lang="pt-BR" sz="2400" dirty="0"/>
+            </a:br>
+            <a:r>
+              <a:rPr lang="pt-BR" sz="2400" dirty="0" smtClean="0"/>
+              <a:t>*gerenciar </a:t>
+            </a:r>
+            <a:r>
+              <a:rPr lang="pt-BR" sz="2400" dirty="0"/>
+              <a:t>o engajamento dos </a:t>
+            </a:r>
+            <a:r>
+              <a:rPr lang="pt-BR" sz="2400" dirty="0" err="1"/>
+              <a:t>stakeholders</a:t>
+            </a:r>
+            <a:r>
+              <a:rPr lang="pt-BR" sz="2400" dirty="0"/>
+              <a:t>;</a:t>
+            </a:r>
+            <a:br>
+              <a:rPr lang="pt-BR" sz="2400" dirty="0"/>
+            </a:br>
+            <a:r>
+              <a:rPr lang="pt-BR" sz="2400" dirty="0" smtClean="0"/>
+              <a:t>*controlar </a:t>
+            </a:r>
+            <a:r>
+              <a:rPr lang="pt-BR" sz="2400" dirty="0"/>
+              <a:t>o engajamento dos </a:t>
+            </a:r>
+            <a:r>
+              <a:rPr lang="pt-BR" sz="2400" dirty="0" err="1"/>
+              <a:t>stakeholders</a:t>
+            </a:r>
+            <a:r>
+              <a:rPr lang="pt-BR" sz="2400" dirty="0"/>
+              <a:t>.</a:t>
+            </a:r>
+            <a:br>
+              <a:rPr lang="pt-BR" sz="2400" dirty="0"/>
+            </a:br>
+            <a:r>
+              <a:rPr lang="pt-BR" sz="2400" dirty="0"/>
+              <a:t/>
+            </a:r>
+            <a:br>
+              <a:rPr lang="pt-BR" sz="2400" dirty="0"/>
+            </a:br>
+            <a:endParaRPr lang="pt-BR" sz="2400" dirty="0"/>
+          </a:p>
+        </p:txBody>
+      </p:sp>
+    </p:spTree>
+    <p:extLst>
+      <p:ext uri="{BB962C8B-B14F-4D97-AF65-F5344CB8AC3E}">
+        <p14:creationId xmlns:p14="http://schemas.microsoft.com/office/powerpoint/2010/main" val="3120798953"/>
+      </p:ext>
+    </p:extLst>
+  </p:cSld>
+  <p:clrMapOvr>
+    <a:masterClrMapping/>
+  </p:clrMapOvr>
+  <mc:AlternateContent xmlns:mc="http://schemas.openxmlformats.org/markup-compatibility/2006" xmlns:p14="http://schemas.microsoft.com/office/powerpoint/2010/main">
+    <mc:Choice Requires="p14">
+      <p:transition spd="slow" p14:dur="2000">
+        <p14:prism isContent="1"/>
+      </p:transition>
+    </mc:Choice>
+    <mc:Fallback xmlns="">
+      <p:transition spd="slow">
+        <p:fade/>
+      </p:transition>
+    </mc:Fallback>
+  </mc:AlternateContent>
+  <p:timing>
+    <p:tnLst>
+      <p:par>
+        <p:cTn id="1" dur="indefinite" restart="never" nodeType="tmRoot"/>
+      </p:par>
+    </p:tnLst>
+  </p:timing>
+</p:sld>
+</file>
+
+<file path=ppt/slides/slide14.xml><?xml version="1.0" encoding="utf-8"?>
+<p:sld xmlns:a="http://schemas.openxmlformats.org/drawingml/2006/main" xmlns:r="http://schemas.openxmlformats.org/officeDocument/2006/relationships" xmlns:p="http://schemas.openxmlformats.org/presentationml/2006/main">
+  <p:cSld>
+    <p:spTree>
+      <p:nvGrpSpPr>
+        <p:cNvPr id="1" name=""/>
+        <p:cNvGrpSpPr/>
+        <p:nvPr/>
+      </p:nvGrpSpPr>
+      <p:grpSpPr>
+        <a:xfrm>
+          <a:off x="0" y="0"/>
+          <a:ext cx="0" cy="0"/>
+          <a:chOff x="0" y="0"/>
+          <a:chExt cx="0" cy="0"/>
+        </a:xfrm>
+      </p:grpSpPr>
+      <p:sp>
+        <p:nvSpPr>
+          <p:cNvPr id="2" name="Título 1"/>
+          <p:cNvSpPr>
+            <a:spLocks noGrp="1"/>
+          </p:cNvSpPr>
+          <p:nvPr>
+            <p:ph type="ctrTitle"/>
+          </p:nvPr>
+        </p:nvSpPr>
+        <p:spPr/>
+        <p:txBody>
+          <a:bodyPr/>
+          <a:lstStyle/>
+          <a:p>
+            <a:pPr algn="ctr"/>
+            <a:r>
+              <a:rPr lang="pt-BR" dirty="0" smtClean="0"/>
+              <a:t>Objetivo</a:t>
+            </a:r>
+            <a:endParaRPr lang="pt-BR" dirty="0"/>
+          </a:p>
+        </p:txBody>
+      </p:sp>
+    </p:spTree>
+    <p:extLst>
+      <p:ext uri="{BB962C8B-B14F-4D97-AF65-F5344CB8AC3E}">
+        <p14:creationId xmlns:p14="http://schemas.microsoft.com/office/powerpoint/2010/main" val="1524190033"/>
+      </p:ext>
+    </p:extLst>
+  </p:cSld>
+  <p:clrMapOvr>
+    <a:masterClrMapping/>
+  </p:clrMapOvr>
+  <mc:AlternateContent xmlns:mc="http://schemas.openxmlformats.org/markup-compatibility/2006" xmlns:p14="http://schemas.microsoft.com/office/powerpoint/2010/main">
+    <mc:Choice Requires="p14">
+      <p:transition spd="slow" p14:dur="2000">
+        <p14:prism isContent="1"/>
+      </p:transition>
+    </mc:Choice>
+    <mc:Fallback xmlns="">
+      <p:transition spd="slow">
+        <p:fade/>
+      </p:transition>
+    </mc:Fallback>
+  </mc:AlternateContent>
+  <p:timing>
+    <p:tnLst>
+      <p:par>
+        <p:cTn id="1" dur="indefinite" restart="never" nodeType="tmRoot"/>
+      </p:par>
+    </p:tnLst>
+  </p:timing>
+</p:sld>
+</file>
+
+<file path=ppt/slides/slide15.xml><?xml version="1.0" encoding="utf-8"?>
+<p:sld xmlns:a="http://schemas.openxmlformats.org/drawingml/2006/main" xmlns:r="http://schemas.openxmlformats.org/officeDocument/2006/relationships" xmlns:p="http://schemas.openxmlformats.org/presentationml/2006/main">
+  <p:cSld>
+    <p:spTree>
+      <p:nvGrpSpPr>
+        <p:cNvPr id="1" name=""/>
+        <p:cNvGrpSpPr/>
+        <p:nvPr/>
+      </p:nvGrpSpPr>
+      <p:grpSpPr>
+        <a:xfrm>
+          <a:off x="0" y="0"/>
+          <a:ext cx="0" cy="0"/>
+          <a:chOff x="0" y="0"/>
+          <a:chExt cx="0" cy="0"/>
+        </a:xfrm>
+      </p:grpSpPr>
+      <p:sp>
+        <p:nvSpPr>
+          <p:cNvPr id="2" name="Título 1"/>
+          <p:cNvSpPr>
+            <a:spLocks noGrp="1"/>
+          </p:cNvSpPr>
+          <p:nvPr>
+            <p:ph type="ctrTitle"/>
+          </p:nvPr>
+        </p:nvSpPr>
+        <p:spPr/>
+        <p:txBody>
+          <a:bodyPr/>
+          <a:lstStyle/>
+          <a:p>
+            <a:pPr>
+              <a:lnSpc>
+                <a:spcPct val="150000"/>
+              </a:lnSpc>
+              <a:spcBef>
+                <a:spcPts val="1200"/>
+              </a:spcBef>
+              <a:spcAft>
+                <a:spcPts val="1200"/>
+              </a:spcAft>
+            </a:pPr>
+            <a:r>
+              <a:rPr lang="pt-BR" sz="2400" dirty="0"/>
+              <a:t>*Principal Objetivo;</a:t>
+            </a:r>
+            <a:br>
+              <a:rPr lang="pt-BR" sz="2400" dirty="0"/>
+            </a:br>
+            <a:r>
+              <a:rPr lang="pt-BR" sz="2400" dirty="0"/>
+              <a:t>*Guia  PMBOK ;</a:t>
+            </a:r>
+            <a:br>
+              <a:rPr lang="pt-BR" sz="2400" dirty="0"/>
+            </a:br>
+            <a:r>
+              <a:rPr lang="pt-BR" sz="2400" dirty="0"/>
+              <a:t>*Normas de Gerenciamento de projetos.</a:t>
+            </a:r>
+            <a:endParaRPr lang="pt-BR" sz="2400" dirty="0"/>
+          </a:p>
+        </p:txBody>
+      </p:sp>
+    </p:spTree>
+    <p:extLst>
+      <p:ext uri="{BB962C8B-B14F-4D97-AF65-F5344CB8AC3E}">
+        <p14:creationId xmlns:p14="http://schemas.microsoft.com/office/powerpoint/2010/main" val="1820409416"/>
+      </p:ext>
+    </p:extLst>
+  </p:cSld>
+  <p:clrMapOvr>
+    <a:masterClrMapping/>
+  </p:clrMapOvr>
+  <mc:AlternateContent xmlns:mc="http://schemas.openxmlformats.org/markup-compatibility/2006" xmlns:p14="http://schemas.microsoft.com/office/powerpoint/2010/main">
+    <mc:Choice Requires="p14">
+      <p:transition spd="slow" p14:dur="2000">
+        <p14:prism isContent="1"/>
+      </p:transition>
+    </mc:Choice>
+    <mc:Fallback xmlns="">
+      <p:transition spd="slow">
+        <p:fade/>
+      </p:transition>
+    </mc:Fallback>
+  </mc:AlternateContent>
+  <p:timing>
+    <p:tnLst>
+      <p:par>
+        <p:cTn id="1" dur="indefinite" restart="never" nodeType="tmRoot"/>
+      </p:par>
+    </p:tnLst>
+  </p:timing>
+</p:sld>
+</file>
+
+<file path=ppt/slides/slide16.xml><?xml version="1.0" encoding="utf-8"?>
+<p:sld xmlns:a="http://schemas.openxmlformats.org/drawingml/2006/main" xmlns:r="http://schemas.openxmlformats.org/officeDocument/2006/relationships" xmlns:p="http://schemas.openxmlformats.org/presentationml/2006/main">
+  <p:cSld>
+    <p:spTree>
+      <p:nvGrpSpPr>
+        <p:cNvPr id="1" name=""/>
+        <p:cNvGrpSpPr/>
+        <p:nvPr/>
+      </p:nvGrpSpPr>
+      <p:grpSpPr>
+        <a:xfrm>
+          <a:off x="0" y="0"/>
+          <a:ext cx="0" cy="0"/>
+          <a:chOff x="0" y="0"/>
+          <a:chExt cx="0" cy="0"/>
+        </a:xfrm>
+      </p:grpSpPr>
+      <p:sp>
+        <p:nvSpPr>
+          <p:cNvPr id="2" name="Título 1"/>
+          <p:cNvSpPr>
+            <a:spLocks noGrp="1"/>
+          </p:cNvSpPr>
+          <p:nvPr>
+            <p:ph type="ctrTitle"/>
+          </p:nvPr>
+        </p:nvSpPr>
+        <p:spPr/>
+        <p:txBody>
+          <a:bodyPr/>
+          <a:lstStyle/>
+          <a:p>
+            <a:pPr algn="ctr"/>
+            <a:r>
+              <a:rPr lang="pt-BR" dirty="0" smtClean="0"/>
+              <a:t>vantagens</a:t>
+            </a:r>
+            <a:endParaRPr lang="pt-BR" dirty="0"/>
+          </a:p>
+        </p:txBody>
+      </p:sp>
+    </p:spTree>
+    <p:extLst>
+      <p:ext uri="{BB962C8B-B14F-4D97-AF65-F5344CB8AC3E}">
+        <p14:creationId xmlns:p14="http://schemas.microsoft.com/office/powerpoint/2010/main" val="809806478"/>
+      </p:ext>
+    </p:extLst>
+  </p:cSld>
+  <p:clrMapOvr>
+    <a:masterClrMapping/>
+  </p:clrMapOvr>
+  <mc:AlternateContent xmlns:mc="http://schemas.openxmlformats.org/markup-compatibility/2006" xmlns:p14="http://schemas.microsoft.com/office/powerpoint/2010/main">
+    <mc:Choice Requires="p14">
+      <p:transition spd="slow" p14:dur="2000">
+        <p14:prism isContent="1"/>
+      </p:transition>
+    </mc:Choice>
+    <mc:Fallback xmlns="">
+      <p:transition spd="slow">
+        <p:fade/>
+      </p:transition>
+    </mc:Fallback>
+  </mc:AlternateContent>
+  <p:timing>
+    <p:tnLst>
+      <p:par>
+        <p:cTn id="1" dur="indefinite" restart="never" nodeType="tmRoot"/>
+      </p:par>
+    </p:tnLst>
+  </p:timing>
+</p:sld>
+</file>
+
+<file path=ppt/slides/slide17.xml><?xml version="1.0" encoding="utf-8"?>
+<p:sld xmlns:a="http://schemas.openxmlformats.org/drawingml/2006/main" xmlns:r="http://schemas.openxmlformats.org/officeDocument/2006/relationships" xmlns:p="http://schemas.openxmlformats.org/presentationml/2006/main">
+  <p:cSld>
+    <p:spTree>
+      <p:nvGrpSpPr>
+        <p:cNvPr id="1" name=""/>
+        <p:cNvGrpSpPr/>
+        <p:nvPr/>
+      </p:nvGrpSpPr>
+      <p:grpSpPr>
+        <a:xfrm>
+          <a:off x="0" y="0"/>
+          <a:ext cx="0" cy="0"/>
+          <a:chOff x="0" y="0"/>
+          <a:chExt cx="0" cy="0"/>
+        </a:xfrm>
+      </p:grpSpPr>
+      <p:sp>
+        <p:nvSpPr>
+          <p:cNvPr id="2" name="Título 1"/>
+          <p:cNvSpPr>
+            <a:spLocks noGrp="1"/>
+          </p:cNvSpPr>
+          <p:nvPr>
+            <p:ph type="ctrTitle"/>
+          </p:nvPr>
+        </p:nvSpPr>
+        <p:spPr>
+          <a:xfrm>
+            <a:off x="1051560" y="1244600"/>
+            <a:ext cx="9966960" cy="3403600"/>
+          </a:xfrm>
+        </p:spPr>
+        <p:txBody>
+          <a:bodyPr/>
+          <a:lstStyle/>
+          <a:p>
+            <a:pPr>
+              <a:lnSpc>
+                <a:spcPct val="50000"/>
+              </a:lnSpc>
+              <a:spcBef>
+                <a:spcPts val="1800"/>
+              </a:spcBef>
+              <a:spcAft>
+                <a:spcPts val="1800"/>
+              </a:spcAft>
+            </a:pPr>
+            <a:r>
+              <a:rPr lang="pt-BR" sz="2400" dirty="0"/>
+              <a:t>*Padronização das atividades do gerenciamento do </a:t>
+            </a:r>
+            <a:r>
+              <a:rPr lang="pt-BR" sz="2400" dirty="0" smtClean="0"/>
+              <a:t>projeto;</a:t>
+            </a:r>
+            <a:br>
+              <a:rPr lang="pt-BR" sz="2400" dirty="0" smtClean="0"/>
+            </a:br>
+            <a:r>
+              <a:rPr lang="pt-BR" sz="2400" dirty="0"/>
+              <a:t/>
+            </a:r>
+            <a:br>
+              <a:rPr lang="pt-BR" sz="2400" dirty="0"/>
+            </a:br>
+            <a:r>
+              <a:rPr lang="pt-BR" sz="2400" dirty="0"/>
+              <a:t>*Melhoria no fluxo de comunicação entre as partes </a:t>
+            </a:r>
+            <a:r>
+              <a:rPr lang="pt-BR" sz="2400" dirty="0" smtClean="0"/>
+              <a:t>envolvidas;</a:t>
+            </a:r>
+            <a:br>
+              <a:rPr lang="pt-BR" sz="2400" dirty="0" smtClean="0"/>
+            </a:br>
+            <a:r>
+              <a:rPr lang="pt-BR" sz="2400" dirty="0"/>
+              <a:t/>
+            </a:r>
+            <a:br>
+              <a:rPr lang="pt-BR" sz="2400" dirty="0"/>
+            </a:br>
+            <a:r>
+              <a:rPr lang="pt-BR" sz="2400" dirty="0"/>
+              <a:t>*Redução da negligência das partes </a:t>
+            </a:r>
+            <a:r>
+              <a:rPr lang="pt-BR" sz="2400" dirty="0" smtClean="0"/>
+              <a:t>envolvidas;</a:t>
+            </a:r>
+            <a:br>
+              <a:rPr lang="pt-BR" sz="2400" dirty="0" smtClean="0"/>
+            </a:br>
+            <a:r>
+              <a:rPr lang="pt-BR" sz="2400" dirty="0"/>
+              <a:t/>
+            </a:r>
+            <a:br>
+              <a:rPr lang="pt-BR" sz="2400" dirty="0"/>
+            </a:br>
+            <a:r>
+              <a:rPr lang="pt-BR" sz="2400" dirty="0"/>
+              <a:t>*Ênfase no uso dos recurso de maneira </a:t>
+            </a:r>
+            <a:r>
+              <a:rPr lang="pt-BR" sz="2400" dirty="0" smtClean="0"/>
+              <a:t>eficiente;</a:t>
+            </a:r>
+            <a:br>
+              <a:rPr lang="pt-BR" sz="2400" dirty="0" smtClean="0"/>
+            </a:br>
+            <a:r>
+              <a:rPr lang="pt-BR" sz="2400" dirty="0"/>
+              <a:t/>
+            </a:r>
+            <a:br>
+              <a:rPr lang="pt-BR" sz="2400" dirty="0"/>
+            </a:br>
+            <a:r>
+              <a:rPr lang="pt-BR" sz="2400" dirty="0"/>
+              <a:t>*Ter controle sobre o andamento do </a:t>
+            </a:r>
+            <a:r>
+              <a:rPr lang="pt-BR" sz="2400" dirty="0" smtClean="0"/>
+              <a:t>projeto;</a:t>
+            </a:r>
+            <a:br>
+              <a:rPr lang="pt-BR" sz="2400" dirty="0" smtClean="0"/>
+            </a:br>
+            <a:r>
+              <a:rPr lang="pt-BR" sz="2400" dirty="0"/>
+              <a:t/>
+            </a:r>
+            <a:br>
+              <a:rPr lang="pt-BR" sz="2400" dirty="0"/>
+            </a:br>
+            <a:r>
+              <a:rPr lang="pt-BR" sz="2400" dirty="0"/>
+              <a:t>*Melhora as chance de sucesso de um </a:t>
+            </a:r>
+            <a:r>
+              <a:rPr lang="pt-BR" sz="2400" dirty="0" smtClean="0"/>
+              <a:t>projeto;</a:t>
+            </a:r>
+            <a:br>
+              <a:rPr lang="pt-BR" sz="2400" dirty="0" smtClean="0"/>
+            </a:br>
+            <a:r>
+              <a:rPr lang="pt-BR" sz="2400" dirty="0"/>
+              <a:t/>
+            </a:r>
+            <a:br>
+              <a:rPr lang="pt-BR" sz="2400" dirty="0"/>
+            </a:br>
+            <a:r>
+              <a:rPr lang="pt-BR" sz="2400" dirty="0"/>
+              <a:t>*Pratico na </a:t>
+            </a:r>
+            <a:r>
+              <a:rPr lang="pt-BR" sz="2400" dirty="0" smtClean="0"/>
+              <a:t>implantação, </a:t>
+            </a:r>
+            <a:r>
+              <a:rPr lang="pt-BR" sz="2400" dirty="0"/>
+              <a:t>pois se adapta a qualquer tipo de produto ou ambiente.</a:t>
+            </a:r>
+            <a:endParaRPr lang="pt-BR" sz="2400" dirty="0"/>
+          </a:p>
+        </p:txBody>
+      </p:sp>
+    </p:spTree>
+    <p:extLst>
+      <p:ext uri="{BB962C8B-B14F-4D97-AF65-F5344CB8AC3E}">
+        <p14:creationId xmlns:p14="http://schemas.microsoft.com/office/powerpoint/2010/main" val="3814942238"/>
+      </p:ext>
+    </p:extLst>
+  </p:cSld>
+  <p:clrMapOvr>
+    <a:masterClrMapping/>
+  </p:clrMapOvr>
+  <mc:AlternateContent xmlns:mc="http://schemas.openxmlformats.org/markup-compatibility/2006" xmlns:p14="http://schemas.microsoft.com/office/powerpoint/2010/main">
+    <mc:Choice Requires="p14">
+      <p:transition spd="slow" p14:dur="2000">
+        <p14:prism isContent="1"/>
+      </p:transition>
+    </mc:Choice>
+    <mc:Fallback xmlns="">
+      <p:transition spd="slow">
+        <p:fade/>
+      </p:transition>
+    </mc:Fallback>
+  </mc:AlternateContent>
+  <p:timing>
+    <p:tnLst>
+      <p:par>
+        <p:cTn id="1" dur="indefinite" restart="never" nodeType="tmRoot"/>
+      </p:par>
+    </p:tnLst>
+  </p:timing>
+</p:sld>
+</file>
+
+<file path=ppt/slides/slide18.xml><?xml version="1.0" encoding="utf-8"?>
+<p:sld xmlns:a="http://schemas.openxmlformats.org/drawingml/2006/main" xmlns:r="http://schemas.openxmlformats.org/officeDocument/2006/relationships" xmlns:p="http://schemas.openxmlformats.org/presentationml/2006/main">
+  <p:cSld>
+    <p:spTree>
+      <p:nvGrpSpPr>
+        <p:cNvPr id="1" name=""/>
+        <p:cNvGrpSpPr/>
+        <p:nvPr/>
+      </p:nvGrpSpPr>
+      <p:grpSpPr>
+        <a:xfrm>
+          <a:off x="0" y="0"/>
+          <a:ext cx="0" cy="0"/>
+          <a:chOff x="0" y="0"/>
+          <a:chExt cx="0" cy="0"/>
+        </a:xfrm>
+      </p:grpSpPr>
+      <p:sp>
+        <p:nvSpPr>
+          <p:cNvPr id="2" name="Título 1"/>
+          <p:cNvSpPr>
+            <a:spLocks noGrp="1"/>
+          </p:cNvSpPr>
+          <p:nvPr>
+            <p:ph type="ctrTitle"/>
+          </p:nvPr>
+        </p:nvSpPr>
+        <p:spPr/>
+        <p:txBody>
+          <a:bodyPr/>
+          <a:lstStyle/>
+          <a:p>
+            <a:pPr algn="ctr"/>
+            <a:r>
+              <a:rPr lang="pt-BR" dirty="0" smtClean="0"/>
+              <a:t>fim.</a:t>
+            </a:r>
+            <a:br>
+              <a:rPr lang="pt-BR" dirty="0" smtClean="0"/>
+            </a:br>
+            <a:endParaRPr lang="pt-BR" sz="4800" dirty="0"/>
+          </a:p>
+        </p:txBody>
+      </p:sp>
+      <p:sp>
+        <p:nvSpPr>
+          <p:cNvPr id="6" name="Subtítulo 5"/>
+          <p:cNvSpPr>
+            <a:spLocks noGrp="1"/>
+          </p:cNvSpPr>
+          <p:nvPr>
+            <p:ph type="subTitle" idx="1"/>
+          </p:nvPr>
+        </p:nvSpPr>
+        <p:spPr>
+          <a:xfrm>
+            <a:off x="964745" y="4532228"/>
+            <a:ext cx="7891272" cy="1507183"/>
+          </a:xfrm>
+        </p:spPr>
+        <p:txBody>
+          <a:bodyPr>
+            <a:normAutofit fontScale="92500" lnSpcReduction="20000"/>
+          </a:bodyPr>
+          <a:lstStyle/>
+          <a:p>
+            <a:r>
+              <a:rPr lang="pt-BR" dirty="0" smtClean="0">
+                <a:latin typeface="+mj-lt"/>
+              </a:rPr>
+              <a:t>GABRIEL NETO</a:t>
+            </a:r>
+          </a:p>
+          <a:p>
+            <a:r>
+              <a:rPr lang="pt-BR" dirty="0" smtClean="0">
+                <a:latin typeface="+mj-lt"/>
+              </a:rPr>
+              <a:t>JOSE LUCAS</a:t>
+            </a:r>
+          </a:p>
+          <a:p>
+            <a:r>
+              <a:rPr lang="pt-BR" dirty="0" smtClean="0">
+                <a:latin typeface="+mj-lt"/>
+              </a:rPr>
+              <a:t>LUIS CARLOS</a:t>
+            </a:r>
+            <a:endParaRPr lang="pt-BR" dirty="0" smtClean="0">
+              <a:latin typeface="+mj-lt"/>
+            </a:endParaRPr>
+          </a:p>
+          <a:p>
+            <a:r>
+              <a:rPr lang="pt-BR" dirty="0" smtClean="0">
+                <a:latin typeface="+mj-lt"/>
+              </a:rPr>
+              <a:t>THIAGO SANTANA</a:t>
+            </a:r>
+            <a:endParaRPr lang="pt-BR" dirty="0">
+              <a:latin typeface="+mj-lt"/>
+            </a:endParaRPr>
+          </a:p>
+        </p:txBody>
+      </p:sp>
+    </p:spTree>
+    <p:extLst>
+      <p:ext uri="{BB962C8B-B14F-4D97-AF65-F5344CB8AC3E}">
+        <p14:creationId xmlns:p14="http://schemas.microsoft.com/office/powerpoint/2010/main" val="601017295"/>
+      </p:ext>
+    </p:extLst>
+  </p:cSld>
+  <p:clrMapOvr>
+    <a:masterClrMapping/>
+  </p:clrMapOvr>
+  <mc:AlternateContent xmlns:mc="http://schemas.openxmlformats.org/markup-compatibility/2006" xmlns:p15="http://schemas.microsoft.com/office/powerpoint/2012/main">
+    <mc:Choice Requires="p15">
+      <p:transition xmlns:p14="http://schemas.microsoft.com/office/powerpoint/2010/main" spd="slow" p14:dur="3250">
+        <p15:prstTrans prst="origami"/>
       </p:transition>
     </mc:Choice>
     <mc:Fallback xmlns="">
@@ -4220,11 +5480,7 @@
             <a:pPr algn="ctr"/>
             <a:r>
               <a:rPr lang="pt-BR" dirty="0" smtClean="0"/>
-              <a:t>O </a:t>
-            </a:r>
-            <a:r>
-              <a:rPr lang="pt-BR" dirty="0" smtClean="0"/>
-              <a:t>que é?</a:t>
+              <a:t>O que é?</a:t>
             </a:r>
             <a:endParaRPr lang="pt-BR" dirty="0"/>
           </a:p>
@@ -4297,11 +5553,7 @@
             <a:pPr algn="ctr"/>
             <a:r>
               <a:rPr lang="pt-BR" dirty="0" smtClean="0"/>
-              <a:t>O </a:t>
-            </a:r>
-            <a:r>
-              <a:rPr lang="pt-BR" dirty="0" smtClean="0"/>
-              <a:t>que tem nele?</a:t>
+              <a:t>O que tem nele?</a:t>
             </a:r>
             <a:endParaRPr lang="pt-BR" dirty="0"/>
           </a:p>
@@ -4366,24 +5618,109 @@
             <p:ph type="ctrTitle"/>
           </p:nvPr>
         </p:nvSpPr>
-        <p:spPr/>
+        <p:spPr>
+          <a:xfrm>
+            <a:off x="1051560" y="1409699"/>
+            <a:ext cx="9966960" cy="2855131"/>
+          </a:xfrm>
+        </p:spPr>
         <p:txBody>
           <a:bodyPr/>
           <a:lstStyle/>
           <a:p>
-            <a:pPr algn="ctr"/>
-            <a:r>
-              <a:rPr lang="pt-BR" dirty="0" smtClean="0"/>
-              <a:t>Objetivo</a:t>
-            </a:r>
-            <a:endParaRPr lang="pt-BR" dirty="0"/>
+            <a:pPr lvl="0"/>
+            <a:r>
+              <a:rPr lang="pt-BR" sz="3200" dirty="0" smtClean="0"/>
+              <a:t>Gerenciamento da integração</a:t>
+            </a:r>
+            <a:br>
+              <a:rPr lang="pt-BR" sz="3200" dirty="0" smtClean="0"/>
+            </a:br>
+            <a:r>
+              <a:rPr lang="pt-BR" sz="3200" dirty="0" smtClean="0"/>
+              <a:t/>
+            </a:r>
+            <a:br>
+              <a:rPr lang="pt-BR" sz="3200" dirty="0" smtClean="0"/>
+            </a:br>
+            <a:r>
+              <a:rPr lang="pt-BR" sz="3200" dirty="0" smtClean="0"/>
+              <a:t>*</a:t>
+            </a:r>
+            <a:r>
+              <a:rPr lang="pt-BR" sz="2400" dirty="0" smtClean="0"/>
+              <a:t>desenvolver </a:t>
+            </a:r>
+            <a:r>
+              <a:rPr lang="pt-BR" sz="2400" dirty="0"/>
+              <a:t>o termo de abertura;</a:t>
+            </a:r>
+            <a:br>
+              <a:rPr lang="pt-BR" sz="2400" dirty="0"/>
+            </a:br>
+            <a:r>
+              <a:rPr lang="pt-BR" sz="2400" dirty="0" smtClean="0"/>
+              <a:t>*desenvolver </a:t>
+            </a:r>
+            <a:r>
+              <a:rPr lang="pt-BR" sz="2400" dirty="0"/>
+              <a:t>o plano de gerenciamento de projetos;</a:t>
+            </a:r>
+            <a:br>
+              <a:rPr lang="pt-BR" sz="2400" dirty="0"/>
+            </a:br>
+            <a:r>
+              <a:rPr lang="pt-BR" sz="2400" dirty="0" smtClean="0"/>
+              <a:t>*orientar </a:t>
+            </a:r>
+            <a:r>
+              <a:rPr lang="pt-BR" sz="2400" dirty="0"/>
+              <a:t>e gerenciar a execução do projeto;</a:t>
+            </a:r>
+            <a:br>
+              <a:rPr lang="pt-BR" sz="2400" dirty="0"/>
+            </a:br>
+            <a:r>
+              <a:rPr lang="pt-BR" sz="2400" dirty="0" smtClean="0"/>
+              <a:t>*monitorar </a:t>
+            </a:r>
+            <a:r>
+              <a:rPr lang="pt-BR" sz="2400" dirty="0"/>
+              <a:t>e controlar o trabalho do projeto;</a:t>
+            </a:r>
+            <a:br>
+              <a:rPr lang="pt-BR" sz="2400" dirty="0"/>
+            </a:br>
+            <a:r>
+              <a:rPr lang="pt-BR" sz="2400" dirty="0" smtClean="0"/>
+              <a:t>*realizar </a:t>
+            </a:r>
+            <a:r>
+              <a:rPr lang="pt-BR" sz="2400" dirty="0"/>
+              <a:t>controle integrado de mudanças;</a:t>
+            </a:r>
+            <a:br>
+              <a:rPr lang="pt-BR" sz="2400" dirty="0"/>
+            </a:br>
+            <a:r>
+              <a:rPr lang="pt-BR" sz="2400" dirty="0" smtClean="0"/>
+              <a:t>*encerrar </a:t>
+            </a:r>
+            <a:r>
+              <a:rPr lang="pt-BR" sz="2400" dirty="0"/>
+              <a:t>o projeto ou fase.</a:t>
+            </a:r>
+            <a:br>
+              <a:rPr lang="pt-BR" sz="2400" dirty="0"/>
+            </a:br>
+            <a:endParaRPr lang="pt-BR" sz="2400" dirty="0"/>
           </a:p>
         </p:txBody>
       </p:sp>
     </p:spTree>
     <p:extLst>
       <p:ext uri="{BB962C8B-B14F-4D97-AF65-F5344CB8AC3E}">
-        <p14:creationId xmlns:p14="http://schemas.microsoft.com/office/powerpoint/2010/main" val="1524190033"/>
+        <p14:creationId xmlns:p14="http://schemas.microsoft.com/office/powerpoint/2010/main" val="3832828191"/>
       </p:ext>
     </p:extLst>
   </p:cSld>
@@ -4439,24 +5776,116 @@
             <p:ph type="ctrTitle"/>
           </p:nvPr>
         </p:nvSpPr>
-        <p:spPr/>
+        <p:spPr>
+          <a:xfrm>
+            <a:off x="1051560" y="1536699"/>
+            <a:ext cx="9966960" cy="2690031"/>
+          </a:xfrm>
+        </p:spPr>
         <p:txBody>
           <a:bodyPr/>
           <a:lstStyle/>
           <a:p>
-            <a:pPr algn="ctr"/>
-            <a:r>
-              <a:rPr lang="pt-BR" dirty="0" smtClean="0"/>
-              <a:t>vantagens</a:t>
-            </a:r>
-            <a:endParaRPr lang="pt-BR" dirty="0"/>
+            <a:pPr lvl="0"/>
+            <a:r>
+              <a:rPr lang="pt-BR" sz="3200" dirty="0" smtClean="0"/>
+              <a:t>Gerenciamento Do escopo</a:t>
+            </a:r>
+            <a:br>
+              <a:rPr lang="pt-BR" sz="3200" dirty="0" smtClean="0"/>
+            </a:br>
+            <a:r>
+              <a:rPr lang="pt-BR" sz="2400" dirty="0" smtClean="0"/>
+              <a:t/>
+            </a:r>
+            <a:br>
+              <a:rPr lang="pt-BR" sz="2400" dirty="0" smtClean="0"/>
+            </a:br>
+            <a:r>
+              <a:rPr lang="pt-BR" sz="2400" dirty="0" smtClean="0"/>
+              <a:t>*</a:t>
+            </a:r>
+            <a:r>
+              <a:rPr lang="pt-BR" sz="2400" dirty="0" smtClean="0"/>
+              <a:t>plano </a:t>
+            </a:r>
+            <a:r>
+              <a:rPr lang="pt-BR" sz="2400" dirty="0"/>
+              <a:t>de gerenciamento de escopo;</a:t>
+            </a:r>
+            <a:br>
+              <a:rPr lang="pt-BR" sz="2400" dirty="0"/>
+            </a:br>
+            <a:r>
+              <a:rPr lang="pt-BR" sz="2400" dirty="0" smtClean="0"/>
+              <a:t>*coletar </a:t>
+            </a:r>
+            <a:r>
+              <a:rPr lang="pt-BR" sz="2400" dirty="0"/>
+              <a:t>requisitos;</a:t>
+            </a:r>
+            <a:br>
+              <a:rPr lang="pt-BR" sz="2400" dirty="0"/>
+            </a:br>
+            <a:r>
+              <a:rPr lang="pt-BR" sz="2400" dirty="0" smtClean="0"/>
+              <a:t>*definir </a:t>
+            </a:r>
+            <a:r>
+              <a:rPr lang="pt-BR" sz="2400" dirty="0"/>
+              <a:t>o escopo;</a:t>
+            </a:r>
+            <a:br>
+              <a:rPr lang="pt-BR" sz="2400" dirty="0"/>
+            </a:br>
+            <a:r>
+              <a:rPr lang="pt-BR" sz="2400" dirty="0" smtClean="0"/>
+              <a:t>*criar </a:t>
+            </a:r>
+            <a:r>
+              <a:rPr lang="pt-BR" sz="2400" dirty="0"/>
+              <a:t>EAP;</a:t>
+            </a:r>
+            <a:br>
+              <a:rPr lang="pt-BR" sz="2400" dirty="0"/>
+            </a:br>
+            <a:r>
+              <a:rPr lang="pt-BR" sz="2400" dirty="0" smtClean="0"/>
+              <a:t>*validar </a:t>
+            </a:r>
+            <a:r>
+              <a:rPr lang="pt-BR" sz="2400" dirty="0"/>
+              <a:t>escopo;</a:t>
+            </a:r>
+            <a:br>
+              <a:rPr lang="pt-BR" sz="2400" dirty="0"/>
+            </a:br>
+            <a:r>
+              <a:rPr lang="pt-BR" sz="2400" dirty="0" smtClean="0"/>
+              <a:t>*controlar </a:t>
+            </a:r>
+            <a:r>
+              <a:rPr lang="pt-BR" sz="2400" dirty="0"/>
+              <a:t>o escopo.</a:t>
+            </a:r>
+            <a:br>
+              <a:rPr lang="pt-BR" sz="2400" dirty="0"/>
+            </a:br>
+            <a:r>
+              <a:rPr lang="pt-BR" sz="2400" dirty="0" smtClean="0"/>
+              <a:t/>
+            </a:r>
+            <a:br>
+              <a:rPr lang="pt-BR" sz="2400" dirty="0" smtClean="0"/>
+            </a:br>
+            <a:endParaRPr lang="pt-BR" sz="2400" dirty="0"/>
           </a:p>
         </p:txBody>
       </p:sp>
     </p:spTree>
     <p:extLst>
       <p:ext uri="{BB962C8B-B14F-4D97-AF65-F5344CB8AC3E}">
-        <p14:creationId xmlns:p14="http://schemas.microsoft.com/office/powerpoint/2010/main" val="809806478"/>
+        <p14:creationId xmlns:p14="http://schemas.microsoft.com/office/powerpoint/2010/main" val="3630803199"/>
       </p:ext>
     </p:extLst>
   </p:cSld>
@@ -4512,99 +5941,526 @@
             <p:ph type="ctrTitle"/>
           </p:nvPr>
         </p:nvSpPr>
-        <p:spPr/>
+        <p:spPr>
+          <a:xfrm>
+            <a:off x="1051560" y="1663700"/>
+            <a:ext cx="9966960" cy="2324100"/>
+          </a:xfrm>
+        </p:spPr>
         <p:txBody>
           <a:bodyPr/>
           <a:lstStyle/>
           <a:p>
-            <a:pPr algn="ctr"/>
-            <a:r>
-              <a:rPr lang="pt-BR" dirty="0" smtClean="0"/>
-              <a:t>fim</a:t>
-            </a:r>
-            <a:r>
-              <a:rPr lang="pt-BR" dirty="0" smtClean="0"/>
-              <a:t>.</a:t>
-            </a:r>
-            <a:br>
-              <a:rPr lang="pt-BR" dirty="0" smtClean="0"/>
-            </a:br>
-            <a:endParaRPr lang="pt-BR" sz="4800" dirty="0"/>
-          </a:p>
-        </p:txBody>
-      </p:sp>
-      <p:sp>
-        <p:nvSpPr>
-          <p:cNvPr id="6" name="Subtítulo 5"/>
-          <p:cNvSpPr>
-            <a:spLocks noGrp="1"/>
-          </p:cNvSpPr>
-          <p:nvPr>
-            <p:ph type="subTitle" idx="1"/>
-          </p:nvPr>
-        </p:nvSpPr>
-        <p:spPr>
-          <a:xfrm>
-            <a:off x="964745" y="4532228"/>
-            <a:ext cx="7891272" cy="1507183"/>
-          </a:xfrm>
-        </p:spPr>
-        <p:txBody>
-          <a:bodyPr>
-            <a:normAutofit fontScale="92500" lnSpcReduction="20000"/>
-          </a:bodyPr>
-          <a:lstStyle/>
-          <a:p>
-            <a:r>
-              <a:rPr lang="pt-BR" dirty="0" smtClean="0">
-                <a:latin typeface="+mj-lt"/>
-              </a:rPr>
-              <a:t>GABRIEL NETO</a:t>
-            </a:r>
-          </a:p>
-          <a:p>
-            <a:r>
-              <a:rPr lang="pt-BR" dirty="0" smtClean="0">
-                <a:latin typeface="+mj-lt"/>
-              </a:rPr>
-              <a:t>JOSE LUCAS</a:t>
-            </a:r>
-          </a:p>
-          <a:p>
-            <a:r>
-              <a:rPr lang="pt-BR" dirty="0" smtClean="0">
-                <a:latin typeface="+mj-lt"/>
-              </a:rPr>
-              <a:t>LUIS</a:t>
-            </a:r>
-          </a:p>
-          <a:p>
-            <a:r>
-              <a:rPr lang="pt-BR" dirty="0" smtClean="0">
-                <a:latin typeface="+mj-lt"/>
-              </a:rPr>
-              <a:t>THIAGO SANTANA</a:t>
-            </a:r>
-            <a:endParaRPr lang="pt-BR" dirty="0">
-              <a:latin typeface="+mj-lt"/>
-            </a:endParaRPr>
+            <a:pPr lvl="0"/>
+            <a:r>
+              <a:rPr lang="pt-BR" sz="3200" dirty="0" smtClean="0"/>
+              <a:t>Gerenciamento do tempo</a:t>
+            </a:r>
+            <a:br>
+              <a:rPr lang="pt-BR" sz="3200" dirty="0" smtClean="0"/>
+            </a:br>
+            <a:r>
+              <a:rPr lang="pt-BR" sz="3200" dirty="0" smtClean="0"/>
+              <a:t/>
+            </a:r>
+            <a:br>
+              <a:rPr lang="pt-BR" sz="3200" dirty="0" smtClean="0"/>
+            </a:br>
+            <a:r>
+              <a:rPr lang="pt-BR" sz="3200" dirty="0" smtClean="0"/>
+              <a:t>*</a:t>
+            </a:r>
+            <a:r>
+              <a:rPr lang="pt-BR" sz="2400" dirty="0" smtClean="0"/>
+              <a:t>plano </a:t>
+            </a:r>
+            <a:r>
+              <a:rPr lang="pt-BR" sz="2400" dirty="0"/>
+              <a:t>de gerenciamento do cronograma;</a:t>
+            </a:r>
+            <a:br>
+              <a:rPr lang="pt-BR" sz="2400" dirty="0"/>
+            </a:br>
+            <a:r>
+              <a:rPr lang="pt-BR" sz="2400" dirty="0" smtClean="0"/>
+              <a:t>*definir </a:t>
+            </a:r>
+            <a:r>
+              <a:rPr lang="pt-BR" sz="2400" dirty="0"/>
+              <a:t>as atividades;</a:t>
+            </a:r>
+            <a:br>
+              <a:rPr lang="pt-BR" sz="2400" dirty="0"/>
+            </a:br>
+            <a:r>
+              <a:rPr lang="pt-BR" sz="2400" dirty="0" smtClean="0"/>
+              <a:t>*sequenciar </a:t>
+            </a:r>
+            <a:r>
+              <a:rPr lang="pt-BR" sz="2400" dirty="0"/>
+              <a:t>as atividades;</a:t>
+            </a:r>
+            <a:br>
+              <a:rPr lang="pt-BR" sz="2400" dirty="0"/>
+            </a:br>
+            <a:r>
+              <a:rPr lang="pt-BR" sz="2400" dirty="0" smtClean="0"/>
+              <a:t>*estimar </a:t>
+            </a:r>
+            <a:r>
+              <a:rPr lang="pt-BR" sz="2400" dirty="0"/>
+              <a:t>os recursos;</a:t>
+            </a:r>
+            <a:br>
+              <a:rPr lang="pt-BR" sz="2400" dirty="0"/>
+            </a:br>
+            <a:r>
+              <a:rPr lang="pt-BR" sz="2400" dirty="0" smtClean="0"/>
+              <a:t>*estimar </a:t>
+            </a:r>
+            <a:r>
+              <a:rPr lang="pt-BR" sz="2400" dirty="0"/>
+              <a:t>a duração;</a:t>
+            </a:r>
+            <a:br>
+              <a:rPr lang="pt-BR" sz="2400" dirty="0"/>
+            </a:br>
+            <a:r>
+              <a:rPr lang="pt-BR" sz="2400" dirty="0" smtClean="0"/>
+              <a:t>*desenvolver </a:t>
+            </a:r>
+            <a:r>
+              <a:rPr lang="pt-BR" sz="2400" dirty="0"/>
+              <a:t>o cronograma;</a:t>
+            </a:r>
+            <a:br>
+              <a:rPr lang="pt-BR" sz="2400" dirty="0"/>
+            </a:br>
+            <a:r>
+              <a:rPr lang="pt-BR" sz="2400" dirty="0" smtClean="0"/>
+              <a:t>*controlar </a:t>
+            </a:r>
+            <a:r>
+              <a:rPr lang="pt-BR" sz="2400" dirty="0"/>
+              <a:t>o cronograma.</a:t>
+            </a:r>
           </a:p>
         </p:txBody>
       </p:sp>
     </p:spTree>
     <p:extLst>
       <p:ext uri="{BB962C8B-B14F-4D97-AF65-F5344CB8AC3E}">
-        <p14:creationId xmlns:p14="http://schemas.microsoft.com/office/powerpoint/2010/main" val="601017295"/>
+        <p14:creationId xmlns:p14="http://schemas.microsoft.com/office/powerpoint/2010/main" val="2330484185"/>
       </p:ext>
     </p:extLst>
   </p:cSld>
   <p:clrMapOvr>
     <a:masterClrMapping/>
   </p:clrMapOvr>
-  <mc:AlternateContent xmlns:mc="http://schemas.openxmlformats.org/markup-compatibility/2006" xmlns:p15="http://schemas.microsoft.com/office/powerpoint/2012/main">
-    <mc:Choice Requires="p15">
-      <p:transition xmlns:p14="http://schemas.microsoft.com/office/powerpoint/2010/main" spd="slow" p14:dur="3250">
-        <p15:prstTrans prst="origami"/>
+  <mc:AlternateContent xmlns:mc="http://schemas.openxmlformats.org/markup-compatibility/2006" xmlns:p14="http://schemas.microsoft.com/office/powerpoint/2010/main">
+    <mc:Choice Requires="p14">
+      <p:transition spd="slow" p14:dur="2000">
+        <p14:prism isContent="1"/>
+      </p:transition>
+    </mc:Choice>
+    <mc:Fallback xmlns="">
+      <p:transition spd="slow">
+        <p:fade/>
+      </p:transition>
+    </mc:Fallback>
+  </mc:AlternateContent>
+  <p:timing>
+    <p:tnLst>
+      <p:par>
+        <p:cTn id="1" dur="indefinite" restart="never" nodeType="tmRoot"/>
+      </p:par>
+    </p:tnLst>
+  </p:timing>
+</p:sld>
+</file>
+
+<file path=ppt/slides/slide7.xml><?xml version="1.0" encoding="utf-8"?>
+<p:sld xmlns:a="http://schemas.openxmlformats.org/drawingml/2006/main" xmlns:r="http://schemas.openxmlformats.org/officeDocument/2006/relationships" xmlns:p="http://schemas.openxmlformats.org/presentationml/2006/main">
+  <p:cSld>
+    <p:spTree>
+      <p:nvGrpSpPr>
+        <p:cNvPr id="1" name=""/>
+        <p:cNvGrpSpPr/>
+        <p:nvPr/>
+      </p:nvGrpSpPr>
+      <p:grpSpPr>
+        <a:xfrm>
+          <a:off x="0" y="0"/>
+          <a:ext cx="0" cy="0"/>
+          <a:chOff x="0" y="0"/>
+          <a:chExt cx="0" cy="0"/>
+        </a:xfrm>
+      </p:grpSpPr>
+      <p:sp>
+        <p:nvSpPr>
+          <p:cNvPr id="2" name="Título 1"/>
+          <p:cNvSpPr>
+            <a:spLocks noGrp="1"/>
+          </p:cNvSpPr>
+          <p:nvPr>
+            <p:ph type="ctrTitle"/>
+          </p:nvPr>
+        </p:nvSpPr>
+        <p:spPr>
+          <a:xfrm>
+            <a:off x="1051560" y="1216323"/>
+            <a:ext cx="9966960" cy="3035808"/>
+          </a:xfrm>
+        </p:spPr>
+        <p:txBody>
+          <a:bodyPr/>
+          <a:lstStyle/>
+          <a:p>
+            <a:pPr lvl="0"/>
+            <a:r>
+              <a:rPr lang="pt-BR" sz="3200" dirty="0" smtClean="0"/>
+              <a:t>Gerenciamento do custo</a:t>
+            </a:r>
+            <a:br>
+              <a:rPr lang="pt-BR" sz="3200" dirty="0" smtClean="0"/>
+            </a:br>
+            <a:r>
+              <a:rPr lang="pt-BR" sz="3200" dirty="0" smtClean="0"/>
+              <a:t/>
+            </a:r>
+            <a:br>
+              <a:rPr lang="pt-BR" sz="3200" dirty="0" smtClean="0"/>
+            </a:br>
+            <a:r>
+              <a:rPr lang="pt-BR" sz="3200" dirty="0" smtClean="0"/>
+              <a:t>*</a:t>
+            </a:r>
+            <a:r>
+              <a:rPr lang="pt-BR" sz="2400" dirty="0" smtClean="0"/>
+              <a:t>plano </a:t>
+            </a:r>
+            <a:r>
+              <a:rPr lang="pt-BR" sz="2400" dirty="0"/>
+              <a:t>de gerenciamento de custo;</a:t>
+            </a:r>
+            <a:br>
+              <a:rPr lang="pt-BR" sz="2400" dirty="0"/>
+            </a:br>
+            <a:r>
+              <a:rPr lang="pt-BR" sz="2400" dirty="0" smtClean="0"/>
+              <a:t>*estimar </a:t>
+            </a:r>
+            <a:r>
+              <a:rPr lang="pt-BR" sz="2400" dirty="0"/>
+              <a:t>os custos;</a:t>
+            </a:r>
+            <a:br>
+              <a:rPr lang="pt-BR" sz="2400" dirty="0"/>
+            </a:br>
+            <a:r>
+              <a:rPr lang="pt-BR" sz="2400" dirty="0" smtClean="0"/>
+              <a:t>*determinar </a:t>
+            </a:r>
+            <a:r>
+              <a:rPr lang="pt-BR" sz="2400" dirty="0"/>
+              <a:t>o orçamento;</a:t>
+            </a:r>
+            <a:br>
+              <a:rPr lang="pt-BR" sz="2400" dirty="0"/>
+            </a:br>
+            <a:r>
+              <a:rPr lang="pt-BR" sz="2400" dirty="0" smtClean="0"/>
+              <a:t>*controlar </a:t>
+            </a:r>
+            <a:r>
+              <a:rPr lang="pt-BR" sz="2400" dirty="0"/>
+              <a:t>os custos.</a:t>
+            </a:r>
+            <a:br>
+              <a:rPr lang="pt-BR" sz="2400" dirty="0"/>
+            </a:br>
+            <a:r>
+              <a:rPr lang="pt-BR" sz="2400" dirty="0"/>
+              <a:t/>
+            </a:r>
+            <a:br>
+              <a:rPr lang="pt-BR" sz="2400" dirty="0"/>
+            </a:br>
+            <a:endParaRPr lang="pt-BR" sz="2400" dirty="0"/>
+          </a:p>
+        </p:txBody>
+      </p:sp>
+    </p:spTree>
+    <p:extLst>
+      <p:ext uri="{BB962C8B-B14F-4D97-AF65-F5344CB8AC3E}">
+        <p14:creationId xmlns:p14="http://schemas.microsoft.com/office/powerpoint/2010/main" val="3828352326"/>
+      </p:ext>
+    </p:extLst>
+  </p:cSld>
+  <p:clrMapOvr>
+    <a:masterClrMapping/>
+  </p:clrMapOvr>
+  <mc:AlternateContent xmlns:mc="http://schemas.openxmlformats.org/markup-compatibility/2006" xmlns:p14="http://schemas.microsoft.com/office/powerpoint/2010/main">
+    <mc:Choice Requires="p14">
+      <p:transition spd="slow" p14:dur="2000">
+        <p14:prism isContent="1"/>
+      </p:transition>
+    </mc:Choice>
+    <mc:Fallback xmlns="">
+      <p:transition spd="slow">
+        <p:fade/>
+      </p:transition>
+    </mc:Fallback>
+  </mc:AlternateContent>
+  <p:timing>
+    <p:tnLst>
+      <p:par>
+        <p:cTn id="1" dur="indefinite" restart="never" nodeType="tmRoot"/>
+      </p:par>
+    </p:tnLst>
+  </p:timing>
+</p:sld>
+</file>
+
+<file path=ppt/slides/slide8.xml><?xml version="1.0" encoding="utf-8"?>
+<p:sld xmlns:a="http://schemas.openxmlformats.org/drawingml/2006/main" xmlns:r="http://schemas.openxmlformats.org/officeDocument/2006/relationships" xmlns:p="http://schemas.openxmlformats.org/presentationml/2006/main">
+  <p:cSld>
+    <p:spTree>
+      <p:nvGrpSpPr>
+        <p:cNvPr id="1" name=""/>
+        <p:cNvGrpSpPr/>
+        <p:nvPr/>
+      </p:nvGrpSpPr>
+      <p:grpSpPr>
+        <a:xfrm>
+          <a:off x="0" y="0"/>
+          <a:ext cx="0" cy="0"/>
+          <a:chOff x="0" y="0"/>
+          <a:chExt cx="0" cy="0"/>
+        </a:xfrm>
+      </p:grpSpPr>
+      <p:sp>
+        <p:nvSpPr>
+          <p:cNvPr id="2" name="Título 1"/>
+          <p:cNvSpPr>
+            <a:spLocks noGrp="1"/>
+          </p:cNvSpPr>
+          <p:nvPr>
+            <p:ph type="ctrTitle"/>
+          </p:nvPr>
+        </p:nvSpPr>
+        <p:spPr>
+          <a:xfrm>
+            <a:off x="1051560" y="1051223"/>
+            <a:ext cx="9966960" cy="3035808"/>
+          </a:xfrm>
+        </p:spPr>
+        <p:txBody>
+          <a:bodyPr/>
+          <a:lstStyle/>
+          <a:p>
+            <a:pPr lvl="0"/>
+            <a:r>
+              <a:rPr lang="pt-BR" sz="3200" dirty="0" smtClean="0"/>
+              <a:t>Gerenciamento da qualidade</a:t>
+            </a:r>
+            <a:br>
+              <a:rPr lang="pt-BR" sz="3200" dirty="0" smtClean="0"/>
+            </a:br>
+            <a:r>
+              <a:rPr lang="pt-BR" sz="3200" dirty="0" smtClean="0"/>
+              <a:t/>
+            </a:r>
+            <a:br>
+              <a:rPr lang="pt-BR" sz="3200" dirty="0" smtClean="0"/>
+            </a:br>
+            <a:r>
+              <a:rPr lang="pt-BR" sz="3200" dirty="0" smtClean="0"/>
+              <a:t>*</a:t>
+            </a:r>
+            <a:r>
+              <a:rPr lang="pt-BR" sz="2400" dirty="0" smtClean="0"/>
+              <a:t>planejar </a:t>
+            </a:r>
+            <a:r>
+              <a:rPr lang="pt-BR" sz="2400" dirty="0"/>
+              <a:t>gerenciamento da qualidade;</a:t>
+            </a:r>
+            <a:br>
+              <a:rPr lang="pt-BR" sz="2400" dirty="0"/>
+            </a:br>
+            <a:r>
+              <a:rPr lang="pt-BR" sz="2400" dirty="0" smtClean="0"/>
+              <a:t>*realizar </a:t>
+            </a:r>
+            <a:r>
+              <a:rPr lang="pt-BR" sz="2400" dirty="0"/>
+              <a:t>a garantia da qualidade;</a:t>
+            </a:r>
+            <a:br>
+              <a:rPr lang="pt-BR" sz="2400" dirty="0"/>
+            </a:br>
+            <a:r>
+              <a:rPr lang="pt-BR" sz="2400" dirty="0" smtClean="0"/>
+              <a:t>*controlar </a:t>
+            </a:r>
+            <a:r>
+              <a:rPr lang="pt-BR" sz="2400" dirty="0"/>
+              <a:t>a qualidade.</a:t>
+            </a:r>
+            <a:br>
+              <a:rPr lang="pt-BR" sz="2400" dirty="0"/>
+            </a:br>
+            <a:r>
+              <a:rPr lang="pt-BR" sz="2400" dirty="0" smtClean="0"/>
+              <a:t>.</a:t>
+            </a:r>
+            <a:r>
+              <a:rPr lang="pt-BR" sz="2400" dirty="0"/>
+              <a:t/>
+            </a:r>
+            <a:br>
+              <a:rPr lang="pt-BR" sz="2400" dirty="0"/>
+            </a:br>
+            <a:endParaRPr lang="pt-BR" sz="2400" dirty="0"/>
+          </a:p>
+        </p:txBody>
+      </p:sp>
+    </p:spTree>
+    <p:extLst>
+      <p:ext uri="{BB962C8B-B14F-4D97-AF65-F5344CB8AC3E}">
+        <p14:creationId xmlns:p14="http://schemas.microsoft.com/office/powerpoint/2010/main" val="1286478554"/>
+      </p:ext>
+    </p:extLst>
+  </p:cSld>
+  <p:clrMapOvr>
+    <a:masterClrMapping/>
+  </p:clrMapOvr>
+  <mc:AlternateContent xmlns:mc="http://schemas.openxmlformats.org/markup-compatibility/2006" xmlns:p14="http://schemas.microsoft.com/office/powerpoint/2010/main">
+    <mc:Choice Requires="p14">
+      <p:transition spd="slow" p14:dur="2000">
+        <p14:prism isContent="1"/>
+      </p:transition>
+    </mc:Choice>
+    <mc:Fallback xmlns="">
+      <p:transition spd="slow">
+        <p:fade/>
+      </p:transition>
+    </mc:Fallback>
+  </mc:AlternateContent>
+  <p:timing>
+    <p:tnLst>
+      <p:par>
+        <p:cTn id="1" dur="indefinite" restart="never" nodeType="tmRoot"/>
+      </p:par>
+    </p:tnLst>
+  </p:timing>
+</p:sld>
+</file>
+
+<file path=ppt/slides/slide9.xml><?xml version="1.0" encoding="utf-8"?>
+<p:sld xmlns:a="http://schemas.openxmlformats.org/drawingml/2006/main" xmlns:r="http://schemas.openxmlformats.org/officeDocument/2006/relationships" xmlns:p="http://schemas.openxmlformats.org/presentationml/2006/main">
+  <p:cSld>
+    <p:spTree>
+      <p:nvGrpSpPr>
+        <p:cNvPr id="1" name=""/>
+        <p:cNvGrpSpPr/>
+        <p:nvPr/>
+      </p:nvGrpSpPr>
+      <p:grpSpPr>
+        <a:xfrm>
+          <a:off x="0" y="0"/>
+          <a:ext cx="0" cy="0"/>
+          <a:chOff x="0" y="0"/>
+          <a:chExt cx="0" cy="0"/>
+        </a:xfrm>
+      </p:grpSpPr>
+      <p:sp>
+        <p:nvSpPr>
+          <p:cNvPr id="2" name="Título 1"/>
+          <p:cNvSpPr>
+            <a:spLocks noGrp="1"/>
+          </p:cNvSpPr>
+          <p:nvPr>
+            <p:ph type="ctrTitle"/>
+          </p:nvPr>
+        </p:nvSpPr>
+        <p:spPr>
+          <a:xfrm>
+            <a:off x="1051560" y="771823"/>
+            <a:ext cx="9966960" cy="3035808"/>
+          </a:xfrm>
+        </p:spPr>
+        <p:txBody>
+          <a:bodyPr/>
+          <a:lstStyle/>
+          <a:p>
+            <a:pPr lvl="0"/>
+            <a:r>
+              <a:rPr lang="pt-BR" sz="3200" dirty="0" smtClean="0"/>
+              <a:t>Gerenciamento das comunicações</a:t>
+            </a:r>
+            <a:br>
+              <a:rPr lang="pt-BR" sz="3200" dirty="0" smtClean="0"/>
+            </a:br>
+            <a:r>
+              <a:rPr lang="pt-BR" sz="3200" dirty="0"/>
+              <a:t/>
+            </a:r>
+            <a:br>
+              <a:rPr lang="pt-BR" sz="3200" dirty="0"/>
+            </a:br>
+            <a:r>
+              <a:rPr lang="pt-BR" sz="3200" dirty="0" smtClean="0"/>
+              <a:t>*</a:t>
+            </a:r>
+            <a:r>
+              <a:rPr lang="pt-BR" sz="2400" dirty="0" smtClean="0"/>
+              <a:t>planejar </a:t>
+            </a:r>
+            <a:r>
+              <a:rPr lang="pt-BR" sz="2400" dirty="0"/>
+              <a:t>o gerenciamento das comunicações;</a:t>
+            </a:r>
+            <a:br>
+              <a:rPr lang="pt-BR" sz="2400" dirty="0"/>
+            </a:br>
+            <a:r>
+              <a:rPr lang="pt-BR" sz="2400" dirty="0" smtClean="0"/>
+              <a:t>*gerenciar </a:t>
+            </a:r>
+            <a:r>
+              <a:rPr lang="pt-BR" sz="2400" dirty="0"/>
+              <a:t>as comunicações;</a:t>
+            </a:r>
+            <a:br>
+              <a:rPr lang="pt-BR" sz="2400" dirty="0"/>
+            </a:br>
+            <a:r>
+              <a:rPr lang="pt-BR" sz="2400" dirty="0" smtClean="0"/>
+              <a:t>*controlar </a:t>
+            </a:r>
+            <a:r>
+              <a:rPr lang="pt-BR" sz="2400" dirty="0"/>
+              <a:t>as comunicações.</a:t>
+            </a:r>
+          </a:p>
+        </p:txBody>
+      </p:sp>
+    </p:spTree>
+    <p:extLst>
+      <p:ext uri="{BB962C8B-B14F-4D97-AF65-F5344CB8AC3E}">
+        <p14:creationId xmlns:p14="http://schemas.microsoft.com/office/powerpoint/2010/main" val="1686527611"/>
+      </p:ext>
+    </p:extLst>
+  </p:cSld>
+  <p:clrMapOvr>
+    <a:masterClrMapping/>
+  </p:clrMapOvr>
+  <mc:AlternateContent xmlns:mc="http://schemas.openxmlformats.org/markup-compatibility/2006" xmlns:p14="http://schemas.microsoft.com/office/powerpoint/2010/main">
+    <mc:Choice Requires="p14">
+      <p:transition spd="slow" p14:dur="2000">
+        <p14:prism isContent="1"/>
       </p:transition>
     </mc:Choice>
     <mc:Fallback xmlns="">

</xml_diff>